<commit_message>
Statische Version optimiert, Dynamisches Styling für chained / scroll
</commit_message>
<xml_diff>
--- a/assets/svg/2021-01-11 northport Website - Minimal.pptx
+++ b/assets/svg/2021-01-11 northport Website - Minimal.pptx
@@ -20424,7 +20424,7 @@
               <a:rPr lang="de-DE" sz="1100" kern="0" dirty="0">
                 <a:latin typeface="IBM Plex Sans Light" panose="020B0403050203000203" pitchFamily="34" charset="0"/>
               </a:rPr>
-              <a:t>Risikoanalyse und Risiko- management, Entwicklung von Wordings, Bedingungen, Deckungsmodellen und Schadenmodellen</a:t>
+              <a:t>Risikoanalyse und Risikomanagement, Entwicklung von Wordings, Bedingungen, Deckungsmodellen und Schadenmodellen</a:t>
             </a:r>
           </a:p>
         </p:txBody>
@@ -34070,6 +34070,15 @@
 </file>
 
 <file path=customXml/item1.xml><?xml version="1.0" encoding="utf-8"?>
+<?mso-contentType ?>
+<FormTemplates xmlns="http://schemas.microsoft.com/sharepoint/v3/contenttype/forms">
+  <Display>DocumentLibraryForm</Display>
+  <Edit>DocumentLibraryForm</Edit>
+  <New>DocumentLibraryForm</New>
+</FormTemplates>
+</file>
+
+<file path=customXml/item2.xml><?xml version="1.0" encoding="utf-8"?>
 <ct:contentTypeSchema xmlns:ct="http://schemas.microsoft.com/office/2006/metadata/contentType" xmlns:ma="http://schemas.microsoft.com/office/2006/metadata/properties/metaAttributes" ct:_="" ma:_="" ma:contentTypeName="Document" ma:contentTypeID="0x010100617F7EC2A17ACE4BB04E34D697504CCE" ma:contentTypeVersion="10" ma:contentTypeDescription="Create a new document." ma:contentTypeScope="" ma:versionID="0ead37204d072772916ccf4dd2f0138b">
   <xsd:schema xmlns:xsd="http://www.w3.org/2001/XMLSchema" xmlns:xs="http://www.w3.org/2001/XMLSchema" xmlns:p="http://schemas.microsoft.com/office/2006/metadata/properties" xmlns:ns3="3368da28-1a5e-4f09-a211-e90e3c8983c1" xmlns:ns4="6b9329b3-ae6e-482e-87cd-38cd5c01b27d" targetNamespace="http://schemas.microsoft.com/office/2006/metadata/properties" ma:root="true" ma:fieldsID="fcfb1bf82952a56ae7d814c03df921eb" ns3:_="" ns4:_="">
     <xsd:import namespace="3368da28-1a5e-4f09-a211-e90e3c8983c1"/>
@@ -34272,15 +34281,6 @@
 </ct:contentTypeSchema>
 </file>
 
-<file path=customXml/item2.xml><?xml version="1.0" encoding="utf-8"?>
-<?mso-contentType ?>
-<FormTemplates xmlns="http://schemas.microsoft.com/sharepoint/v3/contenttype/forms">
-  <Display>DocumentLibraryForm</Display>
-  <Edit>DocumentLibraryForm</Edit>
-  <New>DocumentLibraryForm</New>
-</FormTemplates>
-</file>
-
 <file path=customXml/item3.xml><?xml version="1.0" encoding="utf-8"?>
 <p:properties xmlns:p="http://schemas.microsoft.com/office/2006/metadata/properties" xmlns:xsi="http://www.w3.org/2001/XMLSchema-instance" xmlns:pc="http://schemas.microsoft.com/office/infopath/2007/PartnerControls">
   <documentManagement/>
@@ -34288,6 +34288,14 @@
 </file>
 
 <file path=customXml/itemProps1.xml><?xml version="1.0" encoding="utf-8"?>
+<ds:datastoreItem xmlns:ds="http://schemas.openxmlformats.org/officeDocument/2006/customXml" ds:itemID="{9DEB8996-D750-414D-B7DE-8361AD38A9FC}">
+  <ds:schemaRefs>
+    <ds:schemaRef ds:uri="http://schemas.microsoft.com/sharepoint/v3/contenttype/forms"/>
+  </ds:schemaRefs>
+</ds:datastoreItem>
+</file>
+
+<file path=customXml/itemProps2.xml><?xml version="1.0" encoding="utf-8"?>
 <ds:datastoreItem xmlns:ds="http://schemas.openxmlformats.org/officeDocument/2006/customXml" ds:itemID="{8AA0712F-AC59-497A-A59D-DE6D7B1C79FA}">
   <ds:schemaRefs>
     <ds:schemaRef ds:uri="http://schemas.microsoft.com/office/2006/metadata/contentType"/>
@@ -34302,14 +34310,6 @@
     <ds:schemaRef ds:uri="http://purl.org/dc/elements/1.1/"/>
     <ds:schemaRef ds:uri="http://purl.org/dc/terms/"/>
     <ds:schemaRef ds:uri="http://schemas.microsoft.com/internal/obd"/>
-  </ds:schemaRefs>
-</ds:datastoreItem>
-</file>
-
-<file path=customXml/itemProps2.xml><?xml version="1.0" encoding="utf-8"?>
-<ds:datastoreItem xmlns:ds="http://schemas.openxmlformats.org/officeDocument/2006/customXml" ds:itemID="{9DEB8996-D750-414D-B7DE-8361AD38A9FC}">
-  <ds:schemaRefs>
-    <ds:schemaRef ds:uri="http://schemas.microsoft.com/sharepoint/v3/contenttype/forms"/>
   </ds:schemaRefs>
 </ds:datastoreItem>
 </file>

</xml_diff>